<commit_message>
Updated presentation slides w/ appropriate size fonts
</commit_message>
<xml_diff>
--- a/presentation/DS7346_Cloud_Computing_Presentation_jrw.pptx
+++ b/presentation/DS7346_Cloud_Computing_Presentation_jrw.pptx
@@ -141,7 +141,7 @@
 <file path=ppt/revisionInfo.xml><?xml version="1.0" encoding="utf-8"?>
 <p1510:revInfo xmlns:a="http://schemas.openxmlformats.org/drawingml/2006/main" xmlns:r="http://schemas.openxmlformats.org/officeDocument/2006/relationships" xmlns:p1510="http://schemas.microsoft.com/office/powerpoint/2015/10/main">
   <p1510:revLst>
-    <p1510:client id="{007D89BB-3B72-1E46-3326-4B88527C5836}" v="1150" dt="2020-11-21T19:41:09.492"/>
+    <p1510:client id="{007D89BB-3B72-1E46-3326-4B88527C5836}" v="1241" dt="2020-11-22T00:21:11.531"/>
     <p1510:client id="{65C67A5B-D439-DD4E-A637-827378D75345}" v="59" dt="2019-10-10T15:48:12.011"/>
   </p1510:revLst>
 </p1510:revInfo>
@@ -152,12 +152,12 @@
   <pc:docChgLst>
     <pc:chgData name="Washburn, Jeff" userId="S::washburnj@smu.edu::5dc30a7c-71e8-4f39-aac0-a62e1c2b59ed" providerId="AD" clId="Web-{007D89BB-3B72-1E46-3326-4B88527C5836}"/>
     <pc:docChg chg="addSld delSld modSld">
-      <pc:chgData name="Washburn, Jeff" userId="S::washburnj@smu.edu::5dc30a7c-71e8-4f39-aac0-a62e1c2b59ed" providerId="AD" clId="Web-{007D89BB-3B72-1E46-3326-4B88527C5836}" dt="2020-11-21T19:41:09.492" v="1107" actId="20577"/>
+      <pc:chgData name="Washburn, Jeff" userId="S::washburnj@smu.edu::5dc30a7c-71e8-4f39-aac0-a62e1c2b59ed" providerId="AD" clId="Web-{007D89BB-3B72-1E46-3326-4B88527C5836}" dt="2020-11-22T00:21:11.531" v="1198" actId="20577"/>
       <pc:docMkLst>
         <pc:docMk/>
       </pc:docMkLst>
       <pc:sldChg chg="addSp delSp modSp">
-        <pc:chgData name="Washburn, Jeff" userId="S::washburnj@smu.edu::5dc30a7c-71e8-4f39-aac0-a62e1c2b59ed" providerId="AD" clId="Web-{007D89BB-3B72-1E46-3326-4B88527C5836}" dt="2020-11-21T19:41:09.492" v="1107" actId="20577"/>
+        <pc:chgData name="Washburn, Jeff" userId="S::washburnj@smu.edu::5dc30a7c-71e8-4f39-aac0-a62e1c2b59ed" providerId="AD" clId="Web-{007D89BB-3B72-1E46-3326-4B88527C5836}" dt="2020-11-22T00:18:26.401" v="1114" actId="20577"/>
         <pc:sldMkLst>
           <pc:docMk/>
           <pc:sldMk cId="3016725513" sldId="621"/>
@@ -195,7 +195,7 @@
           </ac:spMkLst>
         </pc:spChg>
         <pc:spChg chg="add mod">
-          <ac:chgData name="Washburn, Jeff" userId="S::washburnj@smu.edu::5dc30a7c-71e8-4f39-aac0-a62e1c2b59ed" providerId="AD" clId="Web-{007D89BB-3B72-1E46-3326-4B88527C5836}" dt="2020-11-21T19:41:09.492" v="1107" actId="20577"/>
+          <ac:chgData name="Washburn, Jeff" userId="S::washburnj@smu.edu::5dc30a7c-71e8-4f39-aac0-a62e1c2b59ed" providerId="AD" clId="Web-{007D89BB-3B72-1E46-3326-4B88527C5836}" dt="2020-11-22T00:18:26.401" v="1114" actId="20577"/>
           <ac:spMkLst>
             <pc:docMk/>
             <pc:sldMk cId="3016725513" sldId="621"/>
@@ -353,7 +353,7 @@
         </pc:graphicFrameChg>
       </pc:sldChg>
       <pc:sldChg chg="addSp modSp add replId">
-        <pc:chgData name="Washburn, Jeff" userId="S::washburnj@smu.edu::5dc30a7c-71e8-4f39-aac0-a62e1c2b59ed" providerId="AD" clId="Web-{007D89BB-3B72-1E46-3326-4B88527C5836}" dt="2020-11-21T19:11:34.866" v="204" actId="20577"/>
+        <pc:chgData name="Washburn, Jeff" userId="S::washburnj@smu.edu::5dc30a7c-71e8-4f39-aac0-a62e1c2b59ed" providerId="AD" clId="Web-{007D89BB-3B72-1E46-3326-4B88527C5836}" dt="2020-11-22T00:19:02.027" v="1124" actId="20577"/>
         <pc:sldMkLst>
           <pc:docMk/>
           <pc:sldMk cId="3835672411" sldId="637"/>
@@ -375,7 +375,7 @@
           </ac:spMkLst>
         </pc:spChg>
         <pc:spChg chg="mod">
-          <ac:chgData name="Washburn, Jeff" userId="S::washburnj@smu.edu::5dc30a7c-71e8-4f39-aac0-a62e1c2b59ed" providerId="AD" clId="Web-{007D89BB-3B72-1E46-3326-4B88527C5836}" dt="2020-11-21T19:11:34.866" v="204" actId="20577"/>
+          <ac:chgData name="Washburn, Jeff" userId="S::washburnj@smu.edu::5dc30a7c-71e8-4f39-aac0-a62e1c2b59ed" providerId="AD" clId="Web-{007D89BB-3B72-1E46-3326-4B88527C5836}" dt="2020-11-22T00:19:02.027" v="1124" actId="20577"/>
           <ac:spMkLst>
             <pc:docMk/>
             <pc:sldMk cId="3835672411" sldId="637"/>
@@ -392,7 +392,7 @@
         </pc:picChg>
       </pc:sldChg>
       <pc:sldChg chg="addSp delSp modSp add replId">
-        <pc:chgData name="Washburn, Jeff" userId="S::washburnj@smu.edu::5dc30a7c-71e8-4f39-aac0-a62e1c2b59ed" providerId="AD" clId="Web-{007D89BB-3B72-1E46-3326-4B88527C5836}" dt="2020-11-21T19:12:18.913" v="220" actId="20577"/>
+        <pc:chgData name="Washburn, Jeff" userId="S::washburnj@smu.edu::5dc30a7c-71e8-4f39-aac0-a62e1c2b59ed" providerId="AD" clId="Web-{007D89BB-3B72-1E46-3326-4B88527C5836}" dt="2020-11-22T00:18:56.902" v="1121" actId="20577"/>
         <pc:sldMkLst>
           <pc:docMk/>
           <pc:sldMk cId="1628566169" sldId="638"/>
@@ -406,7 +406,7 @@
           </ac:spMkLst>
         </pc:spChg>
         <pc:spChg chg="mod">
-          <ac:chgData name="Washburn, Jeff" userId="S::washburnj@smu.edu::5dc30a7c-71e8-4f39-aac0-a62e1c2b59ed" providerId="AD" clId="Web-{007D89BB-3B72-1E46-3326-4B88527C5836}" dt="2020-11-21T19:12:12.116" v="213" actId="20577"/>
+          <ac:chgData name="Washburn, Jeff" userId="S::washburnj@smu.edu::5dc30a7c-71e8-4f39-aac0-a62e1c2b59ed" providerId="AD" clId="Web-{007D89BB-3B72-1E46-3326-4B88527C5836}" dt="2020-11-22T00:18:56.902" v="1121" actId="20577"/>
           <ac:spMkLst>
             <pc:docMk/>
             <pc:sldMk cId="1628566169" sldId="638"/>
@@ -431,7 +431,7 @@
         </pc:picChg>
       </pc:sldChg>
       <pc:sldChg chg="modSp add replId">
-        <pc:chgData name="Washburn, Jeff" userId="S::washburnj@smu.edu::5dc30a7c-71e8-4f39-aac0-a62e1c2b59ed" providerId="AD" clId="Web-{007D89BB-3B72-1E46-3326-4B88527C5836}" dt="2020-11-21T19:12:54.320" v="229" actId="20577"/>
+        <pc:chgData name="Washburn, Jeff" userId="S::washburnj@smu.edu::5dc30a7c-71e8-4f39-aac0-a62e1c2b59ed" providerId="AD" clId="Web-{007D89BB-3B72-1E46-3326-4B88527C5836}" dt="2020-11-22T00:19:10.215" v="1127" actId="20577"/>
         <pc:sldMkLst>
           <pc:docMk/>
           <pc:sldMk cId="4271702232" sldId="639"/>
@@ -445,7 +445,7 @@
           </ac:spMkLst>
         </pc:spChg>
         <pc:spChg chg="mod">
-          <ac:chgData name="Washburn, Jeff" userId="S::washburnj@smu.edu::5dc30a7c-71e8-4f39-aac0-a62e1c2b59ed" providerId="AD" clId="Web-{007D89BB-3B72-1E46-3326-4B88527C5836}" dt="2020-11-21T19:12:42.132" v="225" actId="20577"/>
+          <ac:chgData name="Washburn, Jeff" userId="S::washburnj@smu.edu::5dc30a7c-71e8-4f39-aac0-a62e1c2b59ed" providerId="AD" clId="Web-{007D89BB-3B72-1E46-3326-4B88527C5836}" dt="2020-11-22T00:19:10.215" v="1127" actId="20577"/>
           <ac:spMkLst>
             <pc:docMk/>
             <pc:sldMk cId="4271702232" sldId="639"/>
@@ -454,7 +454,7 @@
         </pc:spChg>
       </pc:sldChg>
       <pc:sldChg chg="addSp delSp modSp add replId">
-        <pc:chgData name="Washburn, Jeff" userId="S::washburnj@smu.edu::5dc30a7c-71e8-4f39-aac0-a62e1c2b59ed" providerId="AD" clId="Web-{007D89BB-3B72-1E46-3326-4B88527C5836}" dt="2020-11-21T19:33:17.530" v="785" actId="1076"/>
+        <pc:chgData name="Washburn, Jeff" userId="S::washburnj@smu.edu::5dc30a7c-71e8-4f39-aac0-a62e1c2b59ed" providerId="AD" clId="Web-{007D89BB-3B72-1E46-3326-4B88527C5836}" dt="2020-11-22T00:20:33.467" v="1190" actId="1076"/>
         <pc:sldMkLst>
           <pc:docMk/>
           <pc:sldMk cId="2544548506" sldId="640"/>
@@ -476,7 +476,7 @@
           </ac:spMkLst>
         </pc:spChg>
         <pc:spChg chg="mod">
-          <ac:chgData name="Washburn, Jeff" userId="S::washburnj@smu.edu::5dc30a7c-71e8-4f39-aac0-a62e1c2b59ed" providerId="AD" clId="Web-{007D89BB-3B72-1E46-3326-4B88527C5836}" dt="2020-11-21T19:26:31.038" v="519" actId="20577"/>
+          <ac:chgData name="Washburn, Jeff" userId="S::washburnj@smu.edu::5dc30a7c-71e8-4f39-aac0-a62e1c2b59ed" providerId="AD" clId="Web-{007D89BB-3B72-1E46-3326-4B88527C5836}" dt="2020-11-22T00:20:23.092" v="1187" actId="20577"/>
           <ac:spMkLst>
             <pc:docMk/>
             <pc:sldMk cId="2544548506" sldId="640"/>
@@ -500,7 +500,7 @@
           </ac:graphicFrameMkLst>
         </pc:graphicFrameChg>
         <pc:picChg chg="add mod">
-          <ac:chgData name="Washburn, Jeff" userId="S::washburnj@smu.edu::5dc30a7c-71e8-4f39-aac0-a62e1c2b59ed" providerId="AD" clId="Web-{007D89BB-3B72-1E46-3326-4B88527C5836}" dt="2020-11-21T19:33:07.390" v="782" actId="1076"/>
+          <ac:chgData name="Washburn, Jeff" userId="S::washburnj@smu.edu::5dc30a7c-71e8-4f39-aac0-a62e1c2b59ed" providerId="AD" clId="Web-{007D89BB-3B72-1E46-3326-4B88527C5836}" dt="2020-11-22T00:20:31.217" v="1189" actId="1076"/>
           <ac:picMkLst>
             <pc:docMk/>
             <pc:sldMk cId="2544548506" sldId="640"/>
@@ -524,7 +524,7 @@
           </ac:picMkLst>
         </pc:picChg>
         <pc:picChg chg="add mod">
-          <ac:chgData name="Washburn, Jeff" userId="S::washburnj@smu.edu::5dc30a7c-71e8-4f39-aac0-a62e1c2b59ed" providerId="AD" clId="Web-{007D89BB-3B72-1E46-3326-4B88527C5836}" dt="2020-11-21T19:33:10.452" v="783" actId="1076"/>
+          <ac:chgData name="Washburn, Jeff" userId="S::washburnj@smu.edu::5dc30a7c-71e8-4f39-aac0-a62e1c2b59ed" providerId="AD" clId="Web-{007D89BB-3B72-1E46-3326-4B88527C5836}" dt="2020-11-22T00:20:33.467" v="1190" actId="1076"/>
           <ac:picMkLst>
             <pc:docMk/>
             <pc:sldMk cId="2544548506" sldId="640"/>
@@ -533,7 +533,7 @@
         </pc:picChg>
       </pc:sldChg>
       <pc:sldChg chg="addSp delSp modSp add replId">
-        <pc:chgData name="Washburn, Jeff" userId="S::washburnj@smu.edu::5dc30a7c-71e8-4f39-aac0-a62e1c2b59ed" providerId="AD" clId="Web-{007D89BB-3B72-1E46-3326-4B88527C5836}" dt="2020-11-21T19:33:33.703" v="791" actId="20577"/>
+        <pc:chgData name="Washburn, Jeff" userId="S::washburnj@smu.edu::5dc30a7c-71e8-4f39-aac0-a62e1c2b59ed" providerId="AD" clId="Web-{007D89BB-3B72-1E46-3326-4B88527C5836}" dt="2020-11-22T00:20:51.390" v="1192" actId="20577"/>
         <pc:sldMkLst>
           <pc:docMk/>
           <pc:sldMk cId="25033445" sldId="641"/>
@@ -555,7 +555,7 @@
           </ac:spMkLst>
         </pc:spChg>
         <pc:spChg chg="mod">
-          <ac:chgData name="Washburn, Jeff" userId="S::washburnj@smu.edu::5dc30a7c-71e8-4f39-aac0-a62e1c2b59ed" providerId="AD" clId="Web-{007D89BB-3B72-1E46-3326-4B88527C5836}" dt="2020-11-21T19:33:28.859" v="786" actId="20577"/>
+          <ac:chgData name="Washburn, Jeff" userId="S::washburnj@smu.edu::5dc30a7c-71e8-4f39-aac0-a62e1c2b59ed" providerId="AD" clId="Web-{007D89BB-3B72-1E46-3326-4B88527C5836}" dt="2020-11-22T00:20:51.390" v="1192" actId="20577"/>
           <ac:spMkLst>
             <pc:docMk/>
             <pc:sldMk cId="25033445" sldId="641"/>
@@ -603,7 +603,7 @@
         </pc:sldMkLst>
       </pc:sldChg>
       <pc:sldChg chg="addSp delSp modSp new">
-        <pc:chgData name="Washburn, Jeff" userId="S::washburnj@smu.edu::5dc30a7c-71e8-4f39-aac0-a62e1c2b59ed" providerId="AD" clId="Web-{007D89BB-3B72-1E46-3326-4B88527C5836}" dt="2020-11-21T19:18:12.107" v="380" actId="20577"/>
+        <pc:chgData name="Washburn, Jeff" userId="S::washburnj@smu.edu::5dc30a7c-71e8-4f39-aac0-a62e1c2b59ed" providerId="AD" clId="Web-{007D89BB-3B72-1E46-3326-4B88527C5836}" dt="2020-11-22T00:21:11.531" v="1198" actId="20577"/>
         <pc:sldMkLst>
           <pc:docMk/>
           <pc:sldMk cId="1891052242" sldId="643"/>
@@ -625,7 +625,7 @@
           </ac:spMkLst>
         </pc:spChg>
         <pc:spChg chg="add mod">
-          <ac:chgData name="Washburn, Jeff" userId="S::washburnj@smu.edu::5dc30a7c-71e8-4f39-aac0-a62e1c2b59ed" providerId="AD" clId="Web-{007D89BB-3B72-1E46-3326-4B88527C5836}" dt="2020-11-21T19:18:12.107" v="380" actId="20577"/>
+          <ac:chgData name="Washburn, Jeff" userId="S::washburnj@smu.edu::5dc30a7c-71e8-4f39-aac0-a62e1c2b59ed" providerId="AD" clId="Web-{007D89BB-3B72-1E46-3326-4B88527C5836}" dt="2020-11-22T00:21:11.531" v="1198" actId="20577"/>
           <ac:spMkLst>
             <pc:docMk/>
             <pc:sldMk cId="1891052242" sldId="643"/>
@@ -1218,7 +1218,7 @@
           <a:p>
             <a:fld id="{1B0D91D7-F22D-4CDC-8F75-E7F369B9B3B7}" type="slidenum">
               <a:rPr lang="en-US" smtClean="0"/>
-              <a:t>8</a:t>
+              <a:t>14</a:t>
             </a:fld>
             <a:endParaRPr lang="en-US"/>
           </a:p>
@@ -1314,7 +1314,7 @@
           <a:p>
             <a:fld id="{1B0D91D7-F22D-4CDC-8F75-E7F369B9B3B7}" type="slidenum">
               <a:rPr lang="en-US" smtClean="0"/>
-              <a:t>10</a:t>
+              <a:t>16</a:t>
             </a:fld>
             <a:endParaRPr lang="en-US"/>
           </a:p>
@@ -1410,7 +1410,7 @@
           <a:p>
             <a:fld id="{1B0D91D7-F22D-4CDC-8F75-E7F369B9B3B7}" type="slidenum">
               <a:rPr lang="en-US" smtClean="0"/>
-              <a:t>11</a:t>
+              <a:t>17</a:t>
             </a:fld>
             <a:endParaRPr lang="en-US"/>
           </a:p>
@@ -1503,7 +1503,7 @@
           <a:p>
             <a:fld id="{1B0D91D7-F22D-4CDC-8F75-E7F369B9B3B7}" type="slidenum">
               <a:rPr lang="en-US" smtClean="0"/>
-              <a:t>13</a:t>
+              <a:t>19</a:t>
             </a:fld>
             <a:endParaRPr lang="en-US"/>
           </a:p>
@@ -1599,7 +1599,7 @@
           <a:p>
             <a:fld id="{1B0D91D7-F22D-4CDC-8F75-E7F369B9B3B7}" type="slidenum">
               <a:rPr lang="en-US" smtClean="0"/>
-              <a:t>14</a:t>
+              <a:t>20</a:t>
             </a:fld>
             <a:endParaRPr lang="en-US"/>
           </a:p>
@@ -1695,7 +1695,7 @@
           <a:p>
             <a:fld id="{1B0D91D7-F22D-4CDC-8F75-E7F369B9B3B7}" type="slidenum">
               <a:rPr lang="en-US" smtClean="0"/>
-              <a:t>15</a:t>
+              <a:t>21</a:t>
             </a:fld>
             <a:endParaRPr lang="en-US"/>
           </a:p>
@@ -1788,7 +1788,7 @@
           <a:p>
             <a:fld id="{1B0D91D7-F22D-4CDC-8F75-E7F369B9B3B7}" type="slidenum">
               <a:rPr lang="en-US" smtClean="0"/>
-              <a:t>16</a:t>
+              <a:t>22</a:t>
             </a:fld>
             <a:endParaRPr lang="en-US"/>
           </a:p>
@@ -4102,84 +4102,86 @@
           </a:bodyPr>
           <a:lstStyle/>
           <a:p>
-            <a:r>
-              <a:rPr lang="en-US" dirty="0">
+            <a:pPr>
+              <a:buFont typeface="Arial"/>
+            </a:pPr>
+            <a:r>
+              <a:rPr lang="en-US" sz="1600" dirty="0">
                 <a:ea typeface="+mn-lt"/>
                 <a:cs typeface="+mn-lt"/>
               </a:rPr>
               <a:t>Next is the cloud deployment and at a high overview utilized: </a:t>
             </a:r>
-            <a:endParaRPr lang="en-US" dirty="0">
+            <a:endParaRPr lang="en-US" sz="1600">
               <a:cs typeface="Arial"/>
             </a:endParaRPr>
           </a:p>
           <a:p>
             <a:pPr lvl="1"/>
             <a:r>
-              <a:rPr lang="en-US" dirty="0">
+              <a:rPr lang="en-US" sz="1600" dirty="0">
                 <a:ea typeface="+mn-lt"/>
                 <a:cs typeface="+mn-lt"/>
               </a:rPr>
               <a:t>Configure Serverless framework</a:t>
             </a:r>
-            <a:endParaRPr lang="en-US" dirty="0">
+            <a:endParaRPr lang="en-US" sz="1600">
               <a:cs typeface="Arial"/>
             </a:endParaRPr>
           </a:p>
           <a:p>
             <a:pPr lvl="1"/>
             <a:r>
-              <a:rPr lang="en-US" dirty="0">
+              <a:rPr lang="en-US" sz="1600" dirty="0">
                 <a:ea typeface="+mn-lt"/>
                 <a:cs typeface="+mn-lt"/>
               </a:rPr>
               <a:t>API Gateway</a:t>
             </a:r>
-            <a:endParaRPr lang="en-US" dirty="0">
+            <a:endParaRPr lang="en-US" sz="1600">
               <a:cs typeface="Arial"/>
             </a:endParaRPr>
           </a:p>
           <a:p>
             <a:pPr lvl="1"/>
             <a:r>
-              <a:rPr lang="en-US" dirty="0">
+              <a:rPr lang="en-US" sz="1600" dirty="0">
                 <a:ea typeface="+mn-lt"/>
                 <a:cs typeface="+mn-lt"/>
               </a:rPr>
               <a:t>Lambda functions</a:t>
             </a:r>
-            <a:endParaRPr lang="en-US" dirty="0">
+            <a:endParaRPr lang="en-US" sz="1600">
               <a:cs typeface="Arial"/>
             </a:endParaRPr>
           </a:p>
           <a:p>
             <a:pPr lvl="1"/>
             <a:r>
-              <a:rPr lang="en-US" dirty="0">
+              <a:rPr lang="en-US" sz="1600" dirty="0">
                 <a:ea typeface="+mn-lt"/>
                 <a:cs typeface="+mn-lt"/>
               </a:rPr>
               <a:t>RDS</a:t>
             </a:r>
-            <a:endParaRPr lang="en-US" dirty="0">
+            <a:endParaRPr lang="en-US" sz="1600">
               <a:cs typeface="Arial"/>
             </a:endParaRPr>
           </a:p>
           <a:p>
             <a:r>
-              <a:rPr lang="en-US" dirty="0">
+              <a:rPr lang="en-US" sz="1600">
                 <a:ea typeface="+mn-lt"/>
                 <a:cs typeface="+mn-lt"/>
               </a:rPr>
-              <a:t> Chance will now walk you through each of those cloud components and how it was deployed to AWS</a:t>
-            </a:r>
-            <a:endParaRPr lang="en-US" dirty="0"/>
-          </a:p>
-          <a:p>
+              <a:t>Chance will now walk you through each of those cloud components and how it was deployed to AWS</a:t>
+            </a:r>
             <a:br>
               <a:rPr lang="en-US" dirty="0"/>
             </a:br>
-            <a:endParaRPr lang="en-US" dirty="0"/>
+            <a:endParaRPr lang="en-US">
+              <a:cs typeface="Arial"/>
+            </a:endParaRPr>
           </a:p>
         </p:txBody>
       </p:sp>
@@ -7309,7 +7311,7 @@
         <p:spPr>
           <a:xfrm>
             <a:off x="390525" y="1457325"/>
-            <a:ext cx="8601075" cy="4247317"/>
+            <a:ext cx="8601075" cy="4657685"/>
           </a:xfrm>
           <a:prstGeom prst="rect">
             <a:avLst/>
@@ -7325,13 +7327,19 @@
           </a:bodyPr>
           <a:lstStyle/>
           <a:p>
-            <a:r>
-              <a:rPr lang="en-US" sz="2400">
+            <a:pPr>
+              <a:lnSpc>
+                <a:spcPct val="150000"/>
+              </a:lnSpc>
+            </a:pPr>
+            <a:r>
+              <a:rPr lang="en-US" sz="2400" dirty="0">
                 <a:ea typeface="+mn-lt"/>
                 <a:cs typeface="+mn-lt"/>
               </a:rPr>
               <a:t>Cloud to help predict the cause of wildfires:</a:t>
             </a:r>
+            <a:endParaRPr lang="en-US"/>
           </a:p>
           <a:p>
             <a:pPr marL="171450" indent="-171450">
@@ -7512,10 +7520,17 @@
             </a:endParaRPr>
           </a:p>
           <a:p>
+            <a:pPr>
+              <a:lnSpc>
+                <a:spcPct val="150000"/>
+              </a:lnSpc>
+            </a:pPr>
             <a:br>
               <a:rPr lang="en-US" dirty="0"/>
             </a:br>
-            <a:endParaRPr lang="en-US" dirty="0"/>
+            <a:endParaRPr lang="en-US" dirty="0">
+              <a:cs typeface="Arial"/>
+            </a:endParaRPr>
           </a:p>
         </p:txBody>
       </p:sp>
@@ -7597,7 +7612,7 @@
         <p:spPr>
           <a:xfrm>
             <a:off x="390525" y="1457325"/>
-            <a:ext cx="8601075" cy="246221"/>
+            <a:ext cx="8601075" cy="307777"/>
           </a:xfrm>
           <a:prstGeom prst="rect">
             <a:avLst/>
@@ -7614,13 +7629,15 @@
           <a:lstStyle/>
           <a:p>
             <a:r>
-              <a:rPr lang="en-US" sz="1000" dirty="0">
+              <a:rPr lang="en-US" sz="1400" dirty="0">
                 <a:ea typeface="+mn-lt"/>
                 <a:cs typeface="+mn-lt"/>
               </a:rPr>
               <a:t>Distribution of the causes of wildfires as seen in Fig 1.</a:t>
             </a:r>
-            <a:endParaRPr lang="en-US" dirty="0"/>
+            <a:endParaRPr lang="en-US" sz="1400">
+              <a:cs typeface="Arial"/>
+            </a:endParaRPr>
           </a:p>
         </p:txBody>
       </p:sp>
@@ -7776,7 +7793,7 @@
         <p:spPr>
           <a:xfrm>
             <a:off x="390525" y="1457325"/>
-            <a:ext cx="8601075" cy="400110"/>
+            <a:ext cx="8601075" cy="523220"/>
           </a:xfrm>
           <a:prstGeom prst="rect">
             <a:avLst/>
@@ -7793,16 +7810,12 @@
           <a:lstStyle/>
           <a:p>
             <a:r>
-              <a:rPr lang="en-US" sz="1000" dirty="0">
+              <a:rPr lang="en-US" sz="1400" dirty="0">
                 <a:ea typeface="+mn-lt"/>
                 <a:cs typeface="+mn-lt"/>
               </a:rPr>
               <a:t>Looking at the number of wildfires per year, it’s somewhat consistent year over year.  While some years are higher, especially 2006, distribution of fires is spread out over the years as seen in Fig 2.</a:t>
             </a:r>
-            <a:endParaRPr lang="en-US" dirty="0">
-              <a:ea typeface="+mn-lt"/>
-              <a:cs typeface="+mn-lt"/>
-            </a:endParaRPr>
           </a:p>
         </p:txBody>
       </p:sp>
@@ -7959,7 +7972,7 @@
         <p:spPr>
           <a:xfrm>
             <a:off x="390525" y="1457325"/>
-            <a:ext cx="8601075" cy="400110"/>
+            <a:ext cx="8601075" cy="523220"/>
           </a:xfrm>
           <a:prstGeom prst="rect">
             <a:avLst/>
@@ -7976,16 +7989,12 @@
           <a:lstStyle/>
           <a:p>
             <a:r>
-              <a:rPr lang="en-US" sz="1000" dirty="0">
+              <a:rPr lang="en-US" sz="1400" dirty="0">
                 <a:ea typeface="+mn-lt"/>
                 <a:cs typeface="+mn-lt"/>
               </a:rPr>
               <a:t>Now looking at the wildfires by state, there’s definitely a skew in the data on the state.  The first 10 states make up a large majority of total number of wildfires as seen in Fig 3.</a:t>
             </a:r>
-            <a:endParaRPr lang="en-US" dirty="0">
-              <a:ea typeface="+mn-lt"/>
-              <a:cs typeface="+mn-lt"/>
-            </a:endParaRPr>
           </a:p>
         </p:txBody>
       </p:sp>
@@ -8156,16 +8165,38 @@
           <a:lstStyle/>
           <a:p>
             <a:r>
-              <a:rPr lang="en-US" sz="1000" dirty="0">
+              <a:rPr lang="en-US" sz="1400">
                 <a:ea typeface="+mn-lt"/>
                 <a:cs typeface="+mn-lt"/>
               </a:rPr>
-              <a:t>In order to predict the cause of a fire, this was looked at as a classification problem.  </a:t>
-            </a:r>
-            <a:endParaRPr lang="en-US" dirty="0">
-              <a:ea typeface="+mn-lt"/>
-              <a:cs typeface="+mn-lt"/>
-            </a:endParaRPr>
+              <a:t>To predict cause of a fire, used classification modeling </a:t>
+            </a:r>
+          </a:p>
+          <a:p>
+            <a:pPr marL="171450" indent="-171450">
+              <a:buFont typeface="Arial"/>
+              <a:buChar char="•"/>
+            </a:pPr>
+            <a:r>
+              <a:rPr lang="en-US" sz="1400">
+                <a:ea typeface="+mn-lt"/>
+                <a:cs typeface="+mn-lt"/>
+              </a:rPr>
+              <a:t>Naive Bayes</a:t>
+            </a:r>
+          </a:p>
+          <a:p>
+            <a:pPr marL="171450" indent="-171450">
+              <a:buFont typeface="Arial"/>
+              <a:buChar char="•"/>
+            </a:pPr>
+            <a:r>
+              <a:rPr lang="en-US" sz="1400">
+                <a:ea typeface="+mn-lt"/>
+                <a:cs typeface="+mn-lt"/>
+              </a:rPr>
+              <a:t>Decision Tree </a:t>
+            </a:r>
           </a:p>
           <a:p>
             <a:endParaRPr lang="en-US" sz="1000" dirty="0">
@@ -8175,58 +8206,13 @@
           </a:p>
           <a:p>
             <a:r>
-              <a:rPr lang="en-US" sz="1000" dirty="0">
-                <a:ea typeface="+mn-lt"/>
-                <a:cs typeface="+mn-lt"/>
-              </a:rPr>
-              <a:t>With that, 2 classification models were used and measured to determine the most useful model.  </a:t>
-            </a:r>
-            <a:endParaRPr lang="en-US">
-              <a:ea typeface="+mn-lt"/>
-              <a:cs typeface="+mn-lt"/>
-            </a:endParaRPr>
-          </a:p>
-          <a:p>
-            <a:r>
-              <a:rPr lang="en-US" sz="1000" dirty="0">
-                <a:ea typeface="+mn-lt"/>
-                <a:cs typeface="+mn-lt"/>
-              </a:rPr>
-              <a:t>- Naive Bayes</a:t>
-            </a:r>
-            <a:endParaRPr lang="en-US" dirty="0">
-              <a:ea typeface="+mn-lt"/>
-              <a:cs typeface="+mn-lt"/>
-            </a:endParaRPr>
-          </a:p>
-          <a:p>
-            <a:r>
-              <a:rPr lang="en-US" sz="1000" dirty="0">
-                <a:ea typeface="+mn-lt"/>
-                <a:cs typeface="+mn-lt"/>
-              </a:rPr>
-              <a:t>- Decision Tree </a:t>
-            </a:r>
-            <a:endParaRPr lang="en-US">
-              <a:ea typeface="+mn-lt"/>
-              <a:cs typeface="+mn-lt"/>
-            </a:endParaRPr>
-          </a:p>
-          <a:p>
-            <a:endParaRPr lang="en-US" sz="1000" dirty="0">
-              <a:ea typeface="+mn-lt"/>
-              <a:cs typeface="+mn-lt"/>
-            </a:endParaRPr>
-          </a:p>
-          <a:p>
-            <a:r>
-              <a:rPr lang="en-US" sz="1000" dirty="0">
+              <a:rPr lang="en-US" sz="1400" dirty="0">
                 <a:ea typeface="+mn-lt"/>
                 <a:cs typeface="+mn-lt"/>
               </a:rPr>
               <a:t>Table 1 describes the features that were used from the dataset and our predictor classification label is the STAT_CAUSE_DESCR with Table 2 showing the possible classifications</a:t>
             </a:r>
-            <a:endParaRPr lang="en-US" dirty="0">
+            <a:endParaRPr lang="en-US" sz="1400">
               <a:cs typeface="Arial"/>
             </a:endParaRPr>
           </a:p>
@@ -8296,7 +8282,7 @@
         </p:blipFill>
         <p:spPr>
           <a:xfrm>
-            <a:off x="619125" y="2876550"/>
+            <a:off x="590550" y="2876550"/>
             <a:ext cx="7981950" cy="1809750"/>
           </a:xfrm>
           <a:prstGeom prst="rect">
@@ -8331,7 +8317,7 @@
         </p:blipFill>
         <p:spPr>
           <a:xfrm>
-            <a:off x="628650" y="5298565"/>
+            <a:off x="609600" y="5298565"/>
             <a:ext cx="2743200" cy="1023370"/>
           </a:xfrm>
           <a:prstGeom prst="rect">
@@ -8464,7 +8450,7 @@
         <p:spPr>
           <a:xfrm>
             <a:off x="390525" y="1457325"/>
-            <a:ext cx="8601075" cy="246221"/>
+            <a:ext cx="8601075" cy="523220"/>
           </a:xfrm>
           <a:prstGeom prst="rect">
             <a:avLst/>
@@ -8481,13 +8467,15 @@
           <a:lstStyle/>
           <a:p>
             <a:r>
-              <a:rPr lang="en-US" sz="1000" dirty="0">
+              <a:rPr lang="en-US" sz="1400" dirty="0">
                 <a:ea typeface="+mn-lt"/>
                 <a:cs typeface="+mn-lt"/>
               </a:rPr>
               <a:t>Once the model has been defined, predictions can be made on new and unseen data.  Table 3 below shows the performance of each of the models</a:t>
             </a:r>
-            <a:endParaRPr lang="en-US" dirty="0"/>
+            <a:endParaRPr lang="en-US" sz="1400">
+              <a:cs typeface="Arial"/>
+            </a:endParaRPr>
           </a:p>
         </p:txBody>
       </p:sp>

</xml_diff>

<commit_message>
Updated jrw preso w/ latest changes
</commit_message>
<xml_diff>
--- a/presentation/DS7346_Cloud_Computing_Presentation_jrw.pptx
+++ b/presentation/DS7346_Cloud_Computing_Presentation_jrw.pptx
@@ -141,509 +141,10 @@
 <file path=ppt/revisionInfo.xml><?xml version="1.0" encoding="utf-8"?>
 <p1510:revInfo xmlns:a="http://schemas.openxmlformats.org/drawingml/2006/main" xmlns:r="http://schemas.openxmlformats.org/officeDocument/2006/relationships" xmlns:p1510="http://schemas.microsoft.com/office/powerpoint/2015/10/main">
   <p1510:revLst>
-    <p1510:client id="{007D89BB-3B72-1E46-3326-4B88527C5836}" v="1241" dt="2020-11-22T00:21:11.531"/>
+    <p1510:client id="{007D89BB-3B72-1E46-3326-4B88527C5836}" v="1276" dt="2020-11-22T01:00:27.309"/>
     <p1510:client id="{65C67A5B-D439-DD4E-A637-827378D75345}" v="59" dt="2019-10-10T15:48:12.011"/>
   </p1510:revLst>
 </p1510:revInfo>
-</file>
-
-<file path=ppt/changesInfos/changesInfo1.xml><?xml version="1.0" encoding="utf-8"?>
-<pc:chgInfo xmlns:a="http://schemas.openxmlformats.org/drawingml/2006/main" xmlns:r="http://schemas.openxmlformats.org/officeDocument/2006/relationships" xmlns:ac="http://schemas.microsoft.com/office/drawing/2013/main/command" xmlns:pc="http://schemas.microsoft.com/office/powerpoint/2013/main/command">
-  <pc:docChgLst>
-    <pc:chgData name="Washburn, Jeff" userId="S::washburnj@smu.edu::5dc30a7c-71e8-4f39-aac0-a62e1c2b59ed" providerId="AD" clId="Web-{007D89BB-3B72-1E46-3326-4B88527C5836}"/>
-    <pc:docChg chg="addSld delSld modSld">
-      <pc:chgData name="Washburn, Jeff" userId="S::washburnj@smu.edu::5dc30a7c-71e8-4f39-aac0-a62e1c2b59ed" providerId="AD" clId="Web-{007D89BB-3B72-1E46-3326-4B88527C5836}" dt="2020-11-22T00:21:11.531" v="1198" actId="20577"/>
-      <pc:docMkLst>
-        <pc:docMk/>
-      </pc:docMkLst>
-      <pc:sldChg chg="addSp delSp modSp">
-        <pc:chgData name="Washburn, Jeff" userId="S::washburnj@smu.edu::5dc30a7c-71e8-4f39-aac0-a62e1c2b59ed" providerId="AD" clId="Web-{007D89BB-3B72-1E46-3326-4B88527C5836}" dt="2020-11-22T00:18:26.401" v="1114" actId="20577"/>
-        <pc:sldMkLst>
-          <pc:docMk/>
-          <pc:sldMk cId="3016725513" sldId="621"/>
-        </pc:sldMkLst>
-        <pc:spChg chg="mod">
-          <ac:chgData name="Washburn, Jeff" userId="S::washburnj@smu.edu::5dc30a7c-71e8-4f39-aac0-a62e1c2b59ed" providerId="AD" clId="Web-{007D89BB-3B72-1E46-3326-4B88527C5836}" dt="2020-11-21T19:09:17.472" v="176" actId="20577"/>
-          <ac:spMkLst>
-            <pc:docMk/>
-            <pc:sldMk cId="3016725513" sldId="621"/>
-            <ac:spMk id="2" creationId="{5B931770-76C9-F749-9B7D-08A4A1F13896}"/>
-          </ac:spMkLst>
-        </pc:spChg>
-        <pc:spChg chg="del">
-          <ac:chgData name="Washburn, Jeff" userId="S::washburnj@smu.edu::5dc30a7c-71e8-4f39-aac0-a62e1c2b59ed" providerId="AD" clId="Web-{007D89BB-3B72-1E46-3326-4B88527C5836}" dt="2020-11-21T19:07:44.877" v="138"/>
-          <ac:spMkLst>
-            <pc:docMk/>
-            <pc:sldMk cId="3016725513" sldId="621"/>
-            <ac:spMk id="5" creationId="{375CDB98-7F05-41AD-9F29-81E3D0CFBEFF}"/>
-          </ac:spMkLst>
-        </pc:spChg>
-        <pc:spChg chg="add del mod">
-          <ac:chgData name="Washburn, Jeff" userId="S::washburnj@smu.edu::5dc30a7c-71e8-4f39-aac0-a62e1c2b59ed" providerId="AD" clId="Web-{007D89BB-3B72-1E46-3326-4B88527C5836}" dt="2020-11-21T19:07:50.143" v="140"/>
-          <ac:spMkLst>
-            <pc:docMk/>
-            <pc:sldMk cId="3016725513" sldId="621"/>
-            <ac:spMk id="7" creationId="{03CEDA55-E5FE-4F0F-9CB5-B25447AA60EC}"/>
-          </ac:spMkLst>
-        </pc:spChg>
-        <pc:spChg chg="add del mod">
-          <ac:chgData name="Washburn, Jeff" userId="S::washburnj@smu.edu::5dc30a7c-71e8-4f39-aac0-a62e1c2b59ed" providerId="AD" clId="Web-{007D89BB-3B72-1E46-3326-4B88527C5836}" dt="2020-11-21T19:08:26.190" v="153"/>
-          <ac:spMkLst>
-            <pc:docMk/>
-            <pc:sldMk cId="3016725513" sldId="621"/>
-            <ac:spMk id="8" creationId="{543BC8B9-8D3F-4B00-9970-2A9B8BE6B775}"/>
-          </ac:spMkLst>
-        </pc:spChg>
-        <pc:spChg chg="add mod">
-          <ac:chgData name="Washburn, Jeff" userId="S::washburnj@smu.edu::5dc30a7c-71e8-4f39-aac0-a62e1c2b59ed" providerId="AD" clId="Web-{007D89BB-3B72-1E46-3326-4B88527C5836}" dt="2020-11-22T00:18:26.401" v="1114" actId="20577"/>
-          <ac:spMkLst>
-            <pc:docMk/>
-            <pc:sldMk cId="3016725513" sldId="621"/>
-            <ac:spMk id="10" creationId="{91CFA85A-1BC0-4D92-93B6-B4FC78FA09F5}"/>
-          </ac:spMkLst>
-        </pc:spChg>
-        <pc:picChg chg="del">
-          <ac:chgData name="Washburn, Jeff" userId="S::washburnj@smu.edu::5dc30a7c-71e8-4f39-aac0-a62e1c2b59ed" providerId="AD" clId="Web-{007D89BB-3B72-1E46-3326-4B88527C5836}" dt="2020-11-21T19:07:52.143" v="141"/>
-          <ac:picMkLst>
-            <pc:docMk/>
-            <pc:sldMk cId="3016725513" sldId="621"/>
-            <ac:picMk id="3" creationId="{17A5D552-F225-44DA-9777-952224944CDF}"/>
-          </ac:picMkLst>
-        </pc:picChg>
-        <pc:picChg chg="del">
-          <ac:chgData name="Washburn, Jeff" userId="S::washburnj@smu.edu::5dc30a7c-71e8-4f39-aac0-a62e1c2b59ed" providerId="AD" clId="Web-{007D89BB-3B72-1E46-3326-4B88527C5836}" dt="2020-11-21T19:07:53.158" v="142"/>
-          <ac:picMkLst>
-            <pc:docMk/>
-            <pc:sldMk cId="3016725513" sldId="621"/>
-            <ac:picMk id="4" creationId="{05E12C6C-F6AF-4A12-9246-2A612A40C3DA}"/>
-          </ac:picMkLst>
-        </pc:picChg>
-      </pc:sldChg>
-      <pc:sldChg chg="addSp delSp modSp">
-        <pc:chgData name="Washburn, Jeff" userId="S::washburnj@smu.edu::5dc30a7c-71e8-4f39-aac0-a62e1c2b59ed" providerId="AD" clId="Web-{007D89BB-3B72-1E46-3326-4B88527C5836}" dt="2020-11-21T19:37:41.004" v="904" actId="20577"/>
-        <pc:sldMkLst>
-          <pc:docMk/>
-          <pc:sldMk cId="170715436" sldId="622"/>
-        </pc:sldMkLst>
-        <pc:spChg chg="mod">
-          <ac:chgData name="Washburn, Jeff" userId="S::washburnj@smu.edu::5dc30a7c-71e8-4f39-aac0-a62e1c2b59ed" providerId="AD" clId="Web-{007D89BB-3B72-1E46-3326-4B88527C5836}" dt="2020-11-21T18:59:19.930" v="2" actId="20577"/>
-          <ac:spMkLst>
-            <pc:docMk/>
-            <pc:sldMk cId="170715436" sldId="622"/>
-            <ac:spMk id="2" creationId="{5B931770-76C9-F749-9B7D-08A4A1F13896}"/>
-          </ac:spMkLst>
-        </pc:spChg>
-        <pc:spChg chg="del">
-          <ac:chgData name="Washburn, Jeff" userId="S::washburnj@smu.edu::5dc30a7c-71e8-4f39-aac0-a62e1c2b59ed" providerId="AD" clId="Web-{007D89BB-3B72-1E46-3326-4B88527C5836}" dt="2020-11-21T18:59:26.930" v="4"/>
-          <ac:spMkLst>
-            <pc:docMk/>
-            <pc:sldMk cId="170715436" sldId="622"/>
-            <ac:spMk id="5" creationId="{375CDB98-7F05-41AD-9F29-81E3D0CFBEFF}"/>
-          </ac:spMkLst>
-        </pc:spChg>
-        <pc:spChg chg="del mod">
-          <ac:chgData name="Washburn, Jeff" userId="S::washburnj@smu.edu::5dc30a7c-71e8-4f39-aac0-a62e1c2b59ed" providerId="AD" clId="Web-{007D89BB-3B72-1E46-3326-4B88527C5836}" dt="2020-11-21T18:59:44.352" v="10"/>
-          <ac:spMkLst>
-            <pc:docMk/>
-            <pc:sldMk cId="170715436" sldId="622"/>
-            <ac:spMk id="7" creationId="{2FC15A3F-ACC5-4C6F-82AA-3766F8873C78}"/>
-          </ac:spMkLst>
-        </pc:spChg>
-        <pc:spChg chg="del">
-          <ac:chgData name="Washburn, Jeff" userId="S::washburnj@smu.edu::5dc30a7c-71e8-4f39-aac0-a62e1c2b59ed" providerId="AD" clId="Web-{007D89BB-3B72-1E46-3326-4B88527C5836}" dt="2020-11-21T18:59:35.274" v="6"/>
-          <ac:spMkLst>
-            <pc:docMk/>
-            <pc:sldMk cId="170715436" sldId="622"/>
-            <ac:spMk id="8" creationId="{BBBA70E4-5DB7-4EDB-9C20-ED3B83ABB498}"/>
-          </ac:spMkLst>
-        </pc:spChg>
-        <pc:spChg chg="del">
-          <ac:chgData name="Washburn, Jeff" userId="S::washburnj@smu.edu::5dc30a7c-71e8-4f39-aac0-a62e1c2b59ed" providerId="AD" clId="Web-{007D89BB-3B72-1E46-3326-4B88527C5836}" dt="2020-11-21T18:59:39.274" v="8"/>
-          <ac:spMkLst>
-            <pc:docMk/>
-            <pc:sldMk cId="170715436" sldId="622"/>
-            <ac:spMk id="9" creationId="{02F22577-FF19-4B6D-89D9-CFD9B2D65986}"/>
-          </ac:spMkLst>
-        </pc:spChg>
-        <pc:spChg chg="add del mod">
-          <ac:chgData name="Washburn, Jeff" userId="S::washburnj@smu.edu::5dc30a7c-71e8-4f39-aac0-a62e1c2b59ed" providerId="AD" clId="Web-{007D89BB-3B72-1E46-3326-4B88527C5836}" dt="2020-11-21T18:59:30.118" v="5"/>
-          <ac:spMkLst>
-            <pc:docMk/>
-            <pc:sldMk cId="170715436" sldId="622"/>
-            <ac:spMk id="10" creationId="{6E2C0B93-0BCC-4058-96C8-8F048895A82C}"/>
-          </ac:spMkLst>
-        </pc:spChg>
-        <pc:spChg chg="add mod">
-          <ac:chgData name="Washburn, Jeff" userId="S::washburnj@smu.edu::5dc30a7c-71e8-4f39-aac0-a62e1c2b59ed" providerId="AD" clId="Web-{007D89BB-3B72-1E46-3326-4B88527C5836}" dt="2020-11-21T19:37:41.004" v="904" actId="20577"/>
-          <ac:spMkLst>
-            <pc:docMk/>
-            <pc:sldMk cId="170715436" sldId="622"/>
-            <ac:spMk id="11" creationId="{88FDCBAF-9F2B-436C-8858-0FF1B1F970A2}"/>
-          </ac:spMkLst>
-        </pc:spChg>
-        <pc:picChg chg="del">
-          <ac:chgData name="Washburn, Jeff" userId="S::washburnj@smu.edu::5dc30a7c-71e8-4f39-aac0-a62e1c2b59ed" providerId="AD" clId="Web-{007D89BB-3B72-1E46-3326-4B88527C5836}" dt="2020-11-21T18:59:35.274" v="7"/>
-          <ac:picMkLst>
-            <pc:docMk/>
-            <pc:sldMk cId="170715436" sldId="622"/>
-            <ac:picMk id="3" creationId="{144A0483-CFE7-4D0B-9162-730F48F7B7F4}"/>
-          </ac:picMkLst>
-        </pc:picChg>
-        <pc:picChg chg="del">
-          <ac:chgData name="Washburn, Jeff" userId="S::washburnj@smu.edu::5dc30a7c-71e8-4f39-aac0-a62e1c2b59ed" providerId="AD" clId="Web-{007D89BB-3B72-1E46-3326-4B88527C5836}" dt="2020-11-21T18:59:26.883" v="3"/>
-          <ac:picMkLst>
-            <pc:docMk/>
-            <pc:sldMk cId="170715436" sldId="622"/>
-            <ac:picMk id="4" creationId="{DC96259F-E6CE-4B04-9F81-522004CCF1CE}"/>
-          </ac:picMkLst>
-        </pc:picChg>
-      </pc:sldChg>
-      <pc:sldChg chg="del">
-        <pc:chgData name="Washburn, Jeff" userId="S::washburnj@smu.edu::5dc30a7c-71e8-4f39-aac0-a62e1c2b59ed" providerId="AD" clId="Web-{007D89BB-3B72-1E46-3326-4B88527C5836}" dt="2020-11-21T19:09:25.379" v="178"/>
-        <pc:sldMkLst>
-          <pc:docMk/>
-          <pc:sldMk cId="2857780233" sldId="623"/>
-        </pc:sldMkLst>
-      </pc:sldChg>
-      <pc:sldChg chg="addSp delSp modSp">
-        <pc:chgData name="Washburn, Jeff" userId="S::washburnj@smu.edu::5dc30a7c-71e8-4f39-aac0-a62e1c2b59ed" providerId="AD" clId="Web-{007D89BB-3B72-1E46-3326-4B88527C5836}" dt="2020-11-21T19:39:04.021" v="932" actId="20577"/>
-        <pc:sldMkLst>
-          <pc:docMk/>
-          <pc:sldMk cId="1654918714" sldId="630"/>
-        </pc:sldMkLst>
-        <pc:spChg chg="add del mod">
-          <ac:chgData name="Washburn, Jeff" userId="S::washburnj@smu.edu::5dc30a7c-71e8-4f39-aac0-a62e1c2b59ed" providerId="AD" clId="Web-{007D89BB-3B72-1E46-3326-4B88527C5836}" dt="2020-11-21T19:06:58.720" v="112"/>
-          <ac:spMkLst>
-            <pc:docMk/>
-            <pc:sldMk cId="1654918714" sldId="630"/>
-            <ac:spMk id="2" creationId="{B1AC9C15-90E5-4304-8A55-B2A517ADB20D}"/>
-          </ac:spMkLst>
-        </pc:spChg>
-        <pc:spChg chg="add del mod">
-          <ac:chgData name="Washburn, Jeff" userId="S::washburnj@smu.edu::5dc30a7c-71e8-4f39-aac0-a62e1c2b59ed" providerId="AD" clId="Web-{007D89BB-3B72-1E46-3326-4B88527C5836}" dt="2020-11-21T19:06:58.735" v="113"/>
-          <ac:spMkLst>
-            <pc:docMk/>
-            <pc:sldMk cId="1654918714" sldId="630"/>
-            <ac:spMk id="3" creationId="{C7F5466F-99C1-4526-BF64-CB4B58758F9A}"/>
-          </ac:spMkLst>
-        </pc:spChg>
-        <pc:spChg chg="add del mod">
-          <ac:chgData name="Washburn, Jeff" userId="S::washburnj@smu.edu::5dc30a7c-71e8-4f39-aac0-a62e1c2b59ed" providerId="AD" clId="Web-{007D89BB-3B72-1E46-3326-4B88527C5836}" dt="2020-11-21T19:39:04.021" v="932" actId="20577"/>
-          <ac:spMkLst>
-            <pc:docMk/>
-            <pc:sldMk cId="1654918714" sldId="630"/>
-            <ac:spMk id="5" creationId="{F431C594-07A5-4661-B7B8-18DA62F7910F}"/>
-          </ac:spMkLst>
-        </pc:spChg>
-        <pc:spChg chg="add del mod">
-          <ac:chgData name="Washburn, Jeff" userId="S::washburnj@smu.edu::5dc30a7c-71e8-4f39-aac0-a62e1c2b59ed" providerId="AD" clId="Web-{007D89BB-3B72-1E46-3326-4B88527C5836}" dt="2020-11-21T19:06:58.720" v="112"/>
-          <ac:spMkLst>
-            <pc:docMk/>
-            <pc:sldMk cId="1654918714" sldId="630"/>
-            <ac:spMk id="9" creationId="{6173A978-02E4-4D00-9009-E65B629799C2}"/>
-          </ac:spMkLst>
-        </pc:spChg>
-        <pc:graphicFrameChg chg="del mod modGraphic">
-          <ac:chgData name="Washburn, Jeff" userId="S::washburnj@smu.edu::5dc30a7c-71e8-4f39-aac0-a62e1c2b59ed" providerId="AD" clId="Web-{007D89BB-3B72-1E46-3326-4B88527C5836}" dt="2020-11-21T19:06:31.657" v="103"/>
-          <ac:graphicFrameMkLst>
-            <pc:docMk/>
-            <pc:sldMk cId="1654918714" sldId="630"/>
-            <ac:graphicFrameMk id="6" creationId="{3C91CE52-4B3C-42E5-8D33-725B2966A8FC}"/>
-          </ac:graphicFrameMkLst>
-        </pc:graphicFrameChg>
-      </pc:sldChg>
-      <pc:sldChg chg="addSp modSp add replId">
-        <pc:chgData name="Washburn, Jeff" userId="S::washburnj@smu.edu::5dc30a7c-71e8-4f39-aac0-a62e1c2b59ed" providerId="AD" clId="Web-{007D89BB-3B72-1E46-3326-4B88527C5836}" dt="2020-11-22T00:19:02.027" v="1124" actId="20577"/>
-        <pc:sldMkLst>
-          <pc:docMk/>
-          <pc:sldMk cId="3835672411" sldId="637"/>
-        </pc:sldMkLst>
-        <pc:spChg chg="mod">
-          <ac:chgData name="Washburn, Jeff" userId="S::washburnj@smu.edu::5dc30a7c-71e8-4f39-aac0-a62e1c2b59ed" providerId="AD" clId="Web-{007D89BB-3B72-1E46-3326-4B88527C5836}" dt="2020-11-21T19:09:42.551" v="180" actId="20577"/>
-          <ac:spMkLst>
-            <pc:docMk/>
-            <pc:sldMk cId="3835672411" sldId="637"/>
-            <ac:spMk id="2" creationId="{5B931770-76C9-F749-9B7D-08A4A1F13896}"/>
-          </ac:spMkLst>
-        </pc:spChg>
-        <pc:spChg chg="add mod">
-          <ac:chgData name="Washburn, Jeff" userId="S::washburnj@smu.edu::5dc30a7c-71e8-4f39-aac0-a62e1c2b59ed" providerId="AD" clId="Web-{007D89BB-3B72-1E46-3326-4B88527C5836}" dt="2020-11-21T19:11:32.616" v="202" actId="20577"/>
-          <ac:spMkLst>
-            <pc:docMk/>
-            <pc:sldMk cId="3835672411" sldId="637"/>
-            <ac:spMk id="5" creationId="{D00F2BCE-66B4-4C46-BAFC-8FFD1034CE40}"/>
-          </ac:spMkLst>
-        </pc:spChg>
-        <pc:spChg chg="mod">
-          <ac:chgData name="Washburn, Jeff" userId="S::washburnj@smu.edu::5dc30a7c-71e8-4f39-aac0-a62e1c2b59ed" providerId="AD" clId="Web-{007D89BB-3B72-1E46-3326-4B88527C5836}" dt="2020-11-22T00:19:02.027" v="1124" actId="20577"/>
-          <ac:spMkLst>
-            <pc:docMk/>
-            <pc:sldMk cId="3835672411" sldId="637"/>
-            <ac:spMk id="10" creationId="{91CFA85A-1BC0-4D92-93B6-B4FC78FA09F5}"/>
-          </ac:spMkLst>
-        </pc:spChg>
-        <pc:picChg chg="add mod">
-          <ac:chgData name="Washburn, Jeff" userId="S::washburnj@smu.edu::5dc30a7c-71e8-4f39-aac0-a62e1c2b59ed" providerId="AD" clId="Web-{007D89BB-3B72-1E46-3326-4B88527C5836}" dt="2020-11-21T19:10:47.943" v="192"/>
-          <ac:picMkLst>
-            <pc:docMk/>
-            <pc:sldMk cId="3835672411" sldId="637"/>
-            <ac:picMk id="3" creationId="{23F2AB38-7E9A-4CCF-B5DF-B051D93C0070}"/>
-          </ac:picMkLst>
-        </pc:picChg>
-      </pc:sldChg>
-      <pc:sldChg chg="addSp delSp modSp add replId">
-        <pc:chgData name="Washburn, Jeff" userId="S::washburnj@smu.edu::5dc30a7c-71e8-4f39-aac0-a62e1c2b59ed" providerId="AD" clId="Web-{007D89BB-3B72-1E46-3326-4B88527C5836}" dt="2020-11-22T00:18:56.902" v="1121" actId="20577"/>
-        <pc:sldMkLst>
-          <pc:docMk/>
-          <pc:sldMk cId="1628566169" sldId="638"/>
-        </pc:sldMkLst>
-        <pc:spChg chg="mod">
-          <ac:chgData name="Washburn, Jeff" userId="S::washburnj@smu.edu::5dc30a7c-71e8-4f39-aac0-a62e1c2b59ed" providerId="AD" clId="Web-{007D89BB-3B72-1E46-3326-4B88527C5836}" dt="2020-11-21T19:12:18.913" v="220" actId="20577"/>
-          <ac:spMkLst>
-            <pc:docMk/>
-            <pc:sldMk cId="1628566169" sldId="638"/>
-            <ac:spMk id="5" creationId="{D00F2BCE-66B4-4C46-BAFC-8FFD1034CE40}"/>
-          </ac:spMkLst>
-        </pc:spChg>
-        <pc:spChg chg="mod">
-          <ac:chgData name="Washburn, Jeff" userId="S::washburnj@smu.edu::5dc30a7c-71e8-4f39-aac0-a62e1c2b59ed" providerId="AD" clId="Web-{007D89BB-3B72-1E46-3326-4B88527C5836}" dt="2020-11-22T00:18:56.902" v="1121" actId="20577"/>
-          <ac:spMkLst>
-            <pc:docMk/>
-            <pc:sldMk cId="1628566169" sldId="638"/>
-            <ac:spMk id="10" creationId="{91CFA85A-1BC0-4D92-93B6-B4FC78FA09F5}"/>
-          </ac:spMkLst>
-        </pc:spChg>
-        <pc:picChg chg="del">
-          <ac:chgData name="Washburn, Jeff" userId="S::washburnj@smu.edu::5dc30a7c-71e8-4f39-aac0-a62e1c2b59ed" providerId="AD" clId="Web-{007D89BB-3B72-1E46-3326-4B88527C5836}" dt="2020-11-21T19:11:48.569" v="209"/>
-          <ac:picMkLst>
-            <pc:docMk/>
-            <pc:sldMk cId="1628566169" sldId="638"/>
-            <ac:picMk id="3" creationId="{23F2AB38-7E9A-4CCF-B5DF-B051D93C0070}"/>
-          </ac:picMkLst>
-        </pc:picChg>
-        <pc:picChg chg="add mod">
-          <ac:chgData name="Washburn, Jeff" userId="S::washburnj@smu.edu::5dc30a7c-71e8-4f39-aac0-a62e1c2b59ed" providerId="AD" clId="Web-{007D89BB-3B72-1E46-3326-4B88527C5836}" dt="2020-11-21T19:11:53.522" v="210" actId="1076"/>
-          <ac:picMkLst>
-            <pc:docMk/>
-            <pc:sldMk cId="1628566169" sldId="638"/>
-            <ac:picMk id="4" creationId="{81DCC094-9D77-4CBD-846D-BBEACEA63082}"/>
-          </ac:picMkLst>
-        </pc:picChg>
-      </pc:sldChg>
-      <pc:sldChg chg="modSp add replId">
-        <pc:chgData name="Washburn, Jeff" userId="S::washburnj@smu.edu::5dc30a7c-71e8-4f39-aac0-a62e1c2b59ed" providerId="AD" clId="Web-{007D89BB-3B72-1E46-3326-4B88527C5836}" dt="2020-11-22T00:19:10.215" v="1127" actId="20577"/>
-        <pc:sldMkLst>
-          <pc:docMk/>
-          <pc:sldMk cId="4271702232" sldId="639"/>
-        </pc:sldMkLst>
-        <pc:spChg chg="mod">
-          <ac:chgData name="Washburn, Jeff" userId="S::washburnj@smu.edu::5dc30a7c-71e8-4f39-aac0-a62e1c2b59ed" providerId="AD" clId="Web-{007D89BB-3B72-1E46-3326-4B88527C5836}" dt="2020-11-21T19:12:54.320" v="229" actId="20577"/>
-          <ac:spMkLst>
-            <pc:docMk/>
-            <pc:sldMk cId="4271702232" sldId="639"/>
-            <ac:spMk id="5" creationId="{D00F2BCE-66B4-4C46-BAFC-8FFD1034CE40}"/>
-          </ac:spMkLst>
-        </pc:spChg>
-        <pc:spChg chg="mod">
-          <ac:chgData name="Washburn, Jeff" userId="S::washburnj@smu.edu::5dc30a7c-71e8-4f39-aac0-a62e1c2b59ed" providerId="AD" clId="Web-{007D89BB-3B72-1E46-3326-4B88527C5836}" dt="2020-11-22T00:19:10.215" v="1127" actId="20577"/>
-          <ac:spMkLst>
-            <pc:docMk/>
-            <pc:sldMk cId="4271702232" sldId="639"/>
-            <ac:spMk id="10" creationId="{91CFA85A-1BC0-4D92-93B6-B4FC78FA09F5}"/>
-          </ac:spMkLst>
-        </pc:spChg>
-      </pc:sldChg>
-      <pc:sldChg chg="addSp delSp modSp add replId">
-        <pc:chgData name="Washburn, Jeff" userId="S::washburnj@smu.edu::5dc30a7c-71e8-4f39-aac0-a62e1c2b59ed" providerId="AD" clId="Web-{007D89BB-3B72-1E46-3326-4B88527C5836}" dt="2020-11-22T00:20:33.467" v="1190" actId="1076"/>
-        <pc:sldMkLst>
-          <pc:docMk/>
-          <pc:sldMk cId="2544548506" sldId="640"/>
-        </pc:sldMkLst>
-        <pc:spChg chg="mod">
-          <ac:chgData name="Washburn, Jeff" userId="S::washburnj@smu.edu::5dc30a7c-71e8-4f39-aac0-a62e1c2b59ed" providerId="AD" clId="Web-{007D89BB-3B72-1E46-3326-4B88527C5836}" dt="2020-11-21T19:13:22.930" v="239" actId="20577"/>
-          <ac:spMkLst>
-            <pc:docMk/>
-            <pc:sldMk cId="2544548506" sldId="640"/>
-            <ac:spMk id="2" creationId="{5B931770-76C9-F749-9B7D-08A4A1F13896}"/>
-          </ac:spMkLst>
-        </pc:spChg>
-        <pc:spChg chg="mod">
-          <ac:chgData name="Washburn, Jeff" userId="S::washburnj@smu.edu::5dc30a7c-71e8-4f39-aac0-a62e1c2b59ed" providerId="AD" clId="Web-{007D89BB-3B72-1E46-3326-4B88527C5836}" dt="2020-11-21T19:33:13.202" v="784" actId="1076"/>
-          <ac:spMkLst>
-            <pc:docMk/>
-            <pc:sldMk cId="2544548506" sldId="640"/>
-            <ac:spMk id="5" creationId="{D00F2BCE-66B4-4C46-BAFC-8FFD1034CE40}"/>
-          </ac:spMkLst>
-        </pc:spChg>
-        <pc:spChg chg="mod">
-          <ac:chgData name="Washburn, Jeff" userId="S::washburnj@smu.edu::5dc30a7c-71e8-4f39-aac0-a62e1c2b59ed" providerId="AD" clId="Web-{007D89BB-3B72-1E46-3326-4B88527C5836}" dt="2020-11-22T00:20:23.092" v="1187" actId="20577"/>
-          <ac:spMkLst>
-            <pc:docMk/>
-            <pc:sldMk cId="2544548506" sldId="640"/>
-            <ac:spMk id="10" creationId="{91CFA85A-1BC0-4D92-93B6-B4FC78FA09F5}"/>
-          </ac:spMkLst>
-        </pc:spChg>
-        <pc:spChg chg="add mod">
-          <ac:chgData name="Washburn, Jeff" userId="S::washburnj@smu.edu::5dc30a7c-71e8-4f39-aac0-a62e1c2b59ed" providerId="AD" clId="Web-{007D89BB-3B72-1E46-3326-4B88527C5836}" dt="2020-11-21T19:33:17.530" v="785" actId="1076"/>
-          <ac:spMkLst>
-            <pc:docMk/>
-            <pc:sldMk cId="2544548506" sldId="640"/>
-            <ac:spMk id="11" creationId="{2717E34F-754E-400C-8132-B8BD6F929F80}"/>
-          </ac:spMkLst>
-        </pc:spChg>
-        <pc:graphicFrameChg chg="add del mod modGraphic">
-          <ac:chgData name="Washburn, Jeff" userId="S::washburnj@smu.edu::5dc30a7c-71e8-4f39-aac0-a62e1c2b59ed" providerId="AD" clId="Web-{007D89BB-3B72-1E46-3326-4B88527C5836}" dt="2020-11-21T19:32:09.560" v="735"/>
-          <ac:graphicFrameMkLst>
-            <pc:docMk/>
-            <pc:sldMk cId="2544548506" sldId="640"/>
-            <ac:graphicFrameMk id="7" creationId="{6C2CAD18-3590-4A87-A839-96CFC31A1D7D}"/>
-          </ac:graphicFrameMkLst>
-        </pc:graphicFrameChg>
-        <pc:picChg chg="add mod">
-          <ac:chgData name="Washburn, Jeff" userId="S::washburnj@smu.edu::5dc30a7c-71e8-4f39-aac0-a62e1c2b59ed" providerId="AD" clId="Web-{007D89BB-3B72-1E46-3326-4B88527C5836}" dt="2020-11-22T00:20:31.217" v="1189" actId="1076"/>
-          <ac:picMkLst>
-            <pc:docMk/>
-            <pc:sldMk cId="2544548506" sldId="640"/>
-            <ac:picMk id="3" creationId="{AF61C233-6CB7-4FE0-94D9-D7B7846C279F}"/>
-          </ac:picMkLst>
-        </pc:picChg>
-        <pc:picChg chg="del">
-          <ac:chgData name="Washburn, Jeff" userId="S::washburnj@smu.edu::5dc30a7c-71e8-4f39-aac0-a62e1c2b59ed" providerId="AD" clId="Web-{007D89BB-3B72-1E46-3326-4B88527C5836}" dt="2020-11-21T19:13:23.789" v="240"/>
-          <ac:picMkLst>
-            <pc:docMk/>
-            <pc:sldMk cId="2544548506" sldId="640"/>
-            <ac:picMk id="4" creationId="{81DCC094-9D77-4CBD-846D-BBEACEA63082}"/>
-          </ac:picMkLst>
-        </pc:picChg>
-        <pc:picChg chg="add del mod">
-          <ac:chgData name="Washburn, Jeff" userId="S::washburnj@smu.edu::5dc30a7c-71e8-4f39-aac0-a62e1c2b59ed" providerId="AD" clId="Web-{007D89BB-3B72-1E46-3326-4B88527C5836}" dt="2020-11-21T19:14:15.212" v="276"/>
-          <ac:picMkLst>
-            <pc:docMk/>
-            <pc:sldMk cId="2544548506" sldId="640"/>
-            <ac:picMk id="6" creationId="{50219D7F-EE31-4A4E-A842-5CEE03039C44}"/>
-          </ac:picMkLst>
-        </pc:picChg>
-        <pc:picChg chg="add mod">
-          <ac:chgData name="Washburn, Jeff" userId="S::washburnj@smu.edu::5dc30a7c-71e8-4f39-aac0-a62e1c2b59ed" providerId="AD" clId="Web-{007D89BB-3B72-1E46-3326-4B88527C5836}" dt="2020-11-22T00:20:33.467" v="1190" actId="1076"/>
-          <ac:picMkLst>
-            <pc:docMk/>
-            <pc:sldMk cId="2544548506" sldId="640"/>
-            <ac:picMk id="8" creationId="{18A7D557-B865-4B9D-9EA3-415C7D70D2F1}"/>
-          </ac:picMkLst>
-        </pc:picChg>
-      </pc:sldChg>
-      <pc:sldChg chg="addSp delSp modSp add replId">
-        <pc:chgData name="Washburn, Jeff" userId="S::washburnj@smu.edu::5dc30a7c-71e8-4f39-aac0-a62e1c2b59ed" providerId="AD" clId="Web-{007D89BB-3B72-1E46-3326-4B88527C5836}" dt="2020-11-22T00:20:51.390" v="1192" actId="20577"/>
-        <pc:sldMkLst>
-          <pc:docMk/>
-          <pc:sldMk cId="25033445" sldId="641"/>
-        </pc:sldMkLst>
-        <pc:spChg chg="mod">
-          <ac:chgData name="Washburn, Jeff" userId="S::washburnj@smu.edu::5dc30a7c-71e8-4f39-aac0-a62e1c2b59ed" providerId="AD" clId="Web-{007D89BB-3B72-1E46-3326-4B88527C5836}" dt="2020-11-21T19:14:59.901" v="292" actId="20577"/>
-          <ac:spMkLst>
-            <pc:docMk/>
-            <pc:sldMk cId="25033445" sldId="641"/>
-            <ac:spMk id="2" creationId="{5B931770-76C9-F749-9B7D-08A4A1F13896}"/>
-          </ac:spMkLst>
-        </pc:spChg>
-        <pc:spChg chg="mod">
-          <ac:chgData name="Washburn, Jeff" userId="S::washburnj@smu.edu::5dc30a7c-71e8-4f39-aac0-a62e1c2b59ed" providerId="AD" clId="Web-{007D89BB-3B72-1E46-3326-4B88527C5836}" dt="2020-11-21T19:33:33.703" v="791" actId="20577"/>
-          <ac:spMkLst>
-            <pc:docMk/>
-            <pc:sldMk cId="25033445" sldId="641"/>
-            <ac:spMk id="5" creationId="{D00F2BCE-66B4-4C46-BAFC-8FFD1034CE40}"/>
-          </ac:spMkLst>
-        </pc:spChg>
-        <pc:spChg chg="mod">
-          <ac:chgData name="Washburn, Jeff" userId="S::washburnj@smu.edu::5dc30a7c-71e8-4f39-aac0-a62e1c2b59ed" providerId="AD" clId="Web-{007D89BB-3B72-1E46-3326-4B88527C5836}" dt="2020-11-22T00:20:51.390" v="1192" actId="20577"/>
-          <ac:spMkLst>
-            <pc:docMk/>
-            <pc:sldMk cId="25033445" sldId="641"/>
-            <ac:spMk id="10" creationId="{91CFA85A-1BC0-4D92-93B6-B4FC78FA09F5}"/>
-          </ac:spMkLst>
-        </pc:spChg>
-        <pc:graphicFrameChg chg="add mod modGraphic">
-          <ac:chgData name="Washburn, Jeff" userId="S::washburnj@smu.edu::5dc30a7c-71e8-4f39-aac0-a62e1c2b59ed" providerId="AD" clId="Web-{007D89BB-3B72-1E46-3326-4B88527C5836}" dt="2020-11-21T19:16:24.777" v="359"/>
-          <ac:graphicFrameMkLst>
-            <pc:docMk/>
-            <pc:sldMk cId="25033445" sldId="641"/>
-            <ac:graphicFrameMk id="4" creationId="{C848E221-F138-460A-B4E6-DA3BCEE39FBA}"/>
-          </ac:graphicFrameMkLst>
-        </pc:graphicFrameChg>
-        <pc:picChg chg="del">
-          <ac:chgData name="Washburn, Jeff" userId="S::washburnj@smu.edu::5dc30a7c-71e8-4f39-aac0-a62e1c2b59ed" providerId="AD" clId="Web-{007D89BB-3B72-1E46-3326-4B88527C5836}" dt="2020-11-21T19:15:13.010" v="309"/>
-          <ac:picMkLst>
-            <pc:docMk/>
-            <pc:sldMk cId="25033445" sldId="641"/>
-            <ac:picMk id="3" creationId="{AF61C233-6CB7-4FE0-94D9-D7B7846C279F}"/>
-          </ac:picMkLst>
-        </pc:picChg>
-        <pc:picChg chg="add mod">
-          <ac:chgData name="Washburn, Jeff" userId="S::washburnj@smu.edu::5dc30a7c-71e8-4f39-aac0-a62e1c2b59ed" providerId="AD" clId="Web-{007D89BB-3B72-1E46-3326-4B88527C5836}" dt="2020-11-21T19:16:43.684" v="364" actId="1076"/>
-          <ac:picMkLst>
-            <pc:docMk/>
-            <pc:sldMk cId="25033445" sldId="641"/>
-            <ac:picMk id="6" creationId="{1327F434-4395-4975-B8B5-B01C0BD55403}"/>
-          </ac:picMkLst>
-        </pc:picChg>
-        <pc:picChg chg="add mod">
-          <ac:chgData name="Washburn, Jeff" userId="S::washburnj@smu.edu::5dc30a7c-71e8-4f39-aac0-a62e1c2b59ed" providerId="AD" clId="Web-{007D89BB-3B72-1E46-3326-4B88527C5836}" dt="2020-11-21T19:16:39.324" v="363" actId="1076"/>
-          <ac:picMkLst>
-            <pc:docMk/>
-            <pc:sldMk cId="25033445" sldId="641"/>
-            <ac:picMk id="7" creationId="{B72A4832-4FBD-42BB-A2EF-9B5F637561D0}"/>
-          </ac:picMkLst>
-        </pc:picChg>
-      </pc:sldChg>
-      <pc:sldChg chg="new">
-        <pc:chgData name="Washburn, Jeff" userId="S::washburnj@smu.edu::5dc30a7c-71e8-4f39-aac0-a62e1c2b59ed" providerId="AD" clId="Web-{007D89BB-3B72-1E46-3326-4B88527C5836}" dt="2020-11-21T19:17:24.435" v="366"/>
-        <pc:sldMkLst>
-          <pc:docMk/>
-          <pc:sldMk cId="3404724142" sldId="642"/>
-        </pc:sldMkLst>
-      </pc:sldChg>
-      <pc:sldChg chg="addSp delSp modSp new">
-        <pc:chgData name="Washburn, Jeff" userId="S::washburnj@smu.edu::5dc30a7c-71e8-4f39-aac0-a62e1c2b59ed" providerId="AD" clId="Web-{007D89BB-3B72-1E46-3326-4B88527C5836}" dt="2020-11-22T00:21:11.531" v="1198" actId="20577"/>
-        <pc:sldMkLst>
-          <pc:docMk/>
-          <pc:sldMk cId="1891052242" sldId="643"/>
-        </pc:sldMkLst>
-        <pc:spChg chg="mod">
-          <ac:chgData name="Washburn, Jeff" userId="S::washburnj@smu.edu::5dc30a7c-71e8-4f39-aac0-a62e1c2b59ed" providerId="AD" clId="Web-{007D89BB-3B72-1E46-3326-4B88527C5836}" dt="2020-11-21T19:17:50.107" v="375" actId="20577"/>
-          <ac:spMkLst>
-            <pc:docMk/>
-            <pc:sldMk cId="1891052242" sldId="643"/>
-            <ac:spMk id="2" creationId="{5F201760-3C2B-4914-802C-7921866DC72E}"/>
-          </ac:spMkLst>
-        </pc:spChg>
-        <pc:spChg chg="del">
-          <ac:chgData name="Washburn, Jeff" userId="S::washburnj@smu.edu::5dc30a7c-71e8-4f39-aac0-a62e1c2b59ed" providerId="AD" clId="Web-{007D89BB-3B72-1E46-3326-4B88527C5836}" dt="2020-11-21T19:17:51.732" v="376"/>
-          <ac:spMkLst>
-            <pc:docMk/>
-            <pc:sldMk cId="1891052242" sldId="643"/>
-            <ac:spMk id="3" creationId="{2DD417D4-A141-4404-9C21-A58115CEDDDE}"/>
-          </ac:spMkLst>
-        </pc:spChg>
-        <pc:spChg chg="add mod">
-          <ac:chgData name="Washburn, Jeff" userId="S::washburnj@smu.edu::5dc30a7c-71e8-4f39-aac0-a62e1c2b59ed" providerId="AD" clId="Web-{007D89BB-3B72-1E46-3326-4B88527C5836}" dt="2020-11-22T00:21:11.531" v="1198" actId="20577"/>
-          <ac:spMkLst>
-            <pc:docMk/>
-            <pc:sldMk cId="1891052242" sldId="643"/>
-            <ac:spMk id="6" creationId="{296B1057-D90B-4F6F-ABBD-3E9179C32A23}"/>
-          </ac:spMkLst>
-        </pc:spChg>
-        <pc:picChg chg="add del mod ord">
-          <ac:chgData name="Washburn, Jeff" userId="S::washburnj@smu.edu::5dc30a7c-71e8-4f39-aac0-a62e1c2b59ed" providerId="AD" clId="Web-{007D89BB-3B72-1E46-3326-4B88527C5836}" dt="2020-11-21T19:17:55.982" v="377"/>
-          <ac:picMkLst>
-            <pc:docMk/>
-            <pc:sldMk cId="1891052242" sldId="643"/>
-            <ac:picMk id="4" creationId="{C05D4DB0-21D1-4E70-A318-E0D7049C7BC6}"/>
-          </ac:picMkLst>
-        </pc:picChg>
-      </pc:sldChg>
-    </pc:docChg>
-  </pc:docChgLst>
-</pc:chgInfo>
 </file>
 
 <file path=ppt/notesMasters/notesMaster1.xml><?xml version="1.0" encoding="utf-8"?>
@@ -5775,7 +5276,7 @@
         <p:spPr>
           <a:xfrm>
             <a:off x="390525" y="1457325"/>
-            <a:ext cx="8601075" cy="5509200"/>
+            <a:ext cx="8601075" cy="5201424"/>
           </a:xfrm>
           <a:prstGeom prst="rect">
             <a:avLst/>
@@ -5919,24 +5420,31 @@
                 </a:solidFill>
                 <a:cs typeface="Arial"/>
               </a:rPr>
-              <a:t>Model of computing where servers, networks, storage, development tools, and even applications (apps) are enabled through the internet. </a:t>
-            </a:r>
+              <a:t>Model of computing where servers, networks, storage, development tools, and even applications (apps) </a:t>
+            </a:r>
+            <a:r>
+              <a:rPr lang="en-US" sz="1400">
+                <a:solidFill>
+                  <a:srgbClr val="595959"/>
+                </a:solidFill>
+                <a:cs typeface="Arial"/>
+              </a:rPr>
+              <a:t>are enabled through the internet.</a:t>
+            </a:r>
+            <a:endParaRPr lang="en-US" sz="2400">
+              <a:solidFill>
+                <a:srgbClr val="000000"/>
+              </a:solidFill>
+              <a:cs typeface="Arial"/>
+            </a:endParaRPr>
           </a:p>
           <a:p>
             <a:pPr marL="171450" indent="-171450">
               <a:buFont typeface="Arial"/>
               <a:buChar char="•"/>
             </a:pPr>
-            <a:endParaRPr lang="en-US" sz="1000" dirty="0">
-              <a:solidFill>
-                <a:srgbClr val="595959"/>
-              </a:solidFill>
-              <a:cs typeface="Arial"/>
-            </a:endParaRPr>
-          </a:p>
-          <a:p>
-            <a:r>
-              <a:rPr lang="en-US" sz="2400" dirty="0">
+            <a:r>
+              <a:rPr lang="en-US" sz="1400">
                 <a:solidFill>
                   <a:srgbClr val="595959"/>
                 </a:solidFill>
@@ -5944,15 +5452,24 @@
               </a:rPr>
               <a:t>5 characteristics of cloud computing environment</a:t>
             </a:r>
-            <a:endParaRPr lang="en-US" sz="2400" dirty="0">
+            <a:endParaRPr lang="en-US" sz="1400">
               <a:cs typeface="Arial"/>
             </a:endParaRPr>
           </a:p>
           <a:p>
-            <a:pPr marL="285750" indent="-285750">
+            <a:pPr marL="742950" lvl="1" indent="-285750">
               <a:buFont typeface="Arial"/>
               <a:buChar char="•"/>
             </a:pPr>
+            <a:r>
+              <a:rPr lang="en-US" sz="1400" b="1" i="1" dirty="0">
+                <a:solidFill>
+                  <a:srgbClr val="595959"/>
+                </a:solidFill>
+                <a:cs typeface="Arial"/>
+              </a:rPr>
+              <a:t>On-demand self-service</a:t>
+            </a:r>
             <a:r>
               <a:rPr lang="en-US" sz="1400" dirty="0">
                 <a:solidFill>
@@ -5960,7 +5477,7 @@
                 </a:solidFill>
                 <a:cs typeface="Arial"/>
               </a:rPr>
-              <a:t>On-demand self-service: </a:t>
+              <a:t>: </a:t>
             </a:r>
             <a:r>
               <a:rPr lang="en-US" sz="1000" dirty="0">
@@ -5973,10 +5490,19 @@
             </a:r>
           </a:p>
           <a:p>
-            <a:pPr marL="285750" indent="-285750">
+            <a:pPr marL="742950" lvl="1" indent="-285750">
               <a:buFont typeface="Arial"/>
               <a:buChar char="•"/>
             </a:pPr>
+            <a:r>
+              <a:rPr lang="en-US" sz="1400" b="1" i="1" dirty="0">
+                <a:solidFill>
+                  <a:srgbClr val="595959"/>
+                </a:solidFill>
+                <a:cs typeface="Arial"/>
+              </a:rPr>
+              <a:t>Broadband Network Access</a:t>
+            </a:r>
             <a:r>
               <a:rPr lang="en-US" sz="1400" dirty="0">
                 <a:solidFill>
@@ -5984,7 +5510,7 @@
                 </a:solidFill>
                 <a:cs typeface="Arial"/>
               </a:rPr>
-              <a:t>Broadband Network Access: </a:t>
+              <a:t>: </a:t>
             </a:r>
             <a:r>
               <a:rPr lang="en-US" sz="1000" dirty="0">
@@ -6003,10 +5529,19 @@
             </a:endParaRPr>
           </a:p>
           <a:p>
-            <a:pPr marL="285750" indent="-285750">
+            <a:pPr marL="742950" lvl="1" indent="-285750">
               <a:buFont typeface="Arial"/>
               <a:buChar char="•"/>
             </a:pPr>
+            <a:r>
+              <a:rPr lang="en-US" sz="1400" b="1" i="1" dirty="0">
+                <a:solidFill>
+                  <a:srgbClr val="595959"/>
+                </a:solidFill>
+                <a:cs typeface="Arial"/>
+              </a:rPr>
+              <a:t>Resource Pooling</a:t>
+            </a:r>
             <a:r>
               <a:rPr lang="en-US" sz="1400" dirty="0">
                 <a:solidFill>
@@ -6014,7 +5549,7 @@
                 </a:solidFill>
                 <a:cs typeface="Arial"/>
               </a:rPr>
-              <a:t>Resource Pooling: </a:t>
+              <a:t>: </a:t>
             </a:r>
             <a:r>
               <a:rPr lang="en-US" sz="1000" dirty="0">
@@ -6025,18 +5560,21 @@
               </a:rPr>
               <a:t>Services are pooled to serve multiple consumers using multi-tenant model.  Physical and virtual resources allocation are dynamic based upon demand</a:t>
             </a:r>
-            <a:endParaRPr lang="en-US" sz="1000" dirty="0">
-              <a:solidFill>
-                <a:srgbClr val="000000"/>
-              </a:solidFill>
-              <a:cs typeface="Arial"/>
-            </a:endParaRPr>
-          </a:p>
-          <a:p>
-            <a:pPr marL="285750" indent="-285750">
+          </a:p>
+          <a:p>
+            <a:pPr marL="742950" lvl="1" indent="-285750">
               <a:buFont typeface="Arial"/>
               <a:buChar char="•"/>
             </a:pPr>
+            <a:r>
+              <a:rPr lang="en-US" sz="1400" b="1" i="1" dirty="0">
+                <a:solidFill>
+                  <a:srgbClr val="595959"/>
+                </a:solidFill>
+                <a:cs typeface="Arial"/>
+              </a:rPr>
+              <a:t>Rapid Elasticity</a:t>
+            </a:r>
             <a:r>
               <a:rPr lang="en-US" sz="1400" dirty="0">
                 <a:solidFill>
@@ -6044,7 +5582,7 @@
                 </a:solidFill>
                 <a:cs typeface="Arial"/>
               </a:rPr>
-              <a:t>Rapid Elasticity: </a:t>
+              <a:t>: </a:t>
             </a:r>
             <a:r>
               <a:rPr lang="en-US" sz="1000" dirty="0">
@@ -6063,10 +5601,19 @@
             </a:endParaRPr>
           </a:p>
           <a:p>
-            <a:pPr marL="285750" indent="-285750">
+            <a:pPr marL="742950" lvl="1" indent="-285750">
               <a:buFont typeface="Arial"/>
               <a:buChar char="•"/>
             </a:pPr>
+            <a:r>
+              <a:rPr lang="en-US" sz="1400" b="1" i="1" dirty="0">
+                <a:solidFill>
+                  <a:srgbClr val="595959"/>
+                </a:solidFill>
+                <a:cs typeface="Arial"/>
+              </a:rPr>
+              <a:t>Measured Services</a:t>
+            </a:r>
             <a:r>
               <a:rPr lang="en-US" sz="1400" dirty="0">
                 <a:solidFill>
@@ -6074,7 +5621,7 @@
                 </a:solidFill>
                 <a:cs typeface="Arial"/>
               </a:rPr>
-              <a:t>Measured Services: </a:t>
+              <a:t>: </a:t>
             </a:r>
             <a:r>
               <a:rPr lang="en-US" sz="1000" dirty="0">

</xml_diff>

<commit_message>
Changed font on Figures/Tables to 9pt
</commit_message>
<xml_diff>
--- a/presentation/DS7346_Cloud_Computing_Presentation_jrw.pptx
+++ b/presentation/DS7346_Cloud_Computing_Presentation_jrw.pptx
@@ -141,7 +141,7 @@
 <file path=ppt/revisionInfo.xml><?xml version="1.0" encoding="utf-8"?>
 <p1510:revInfo xmlns:a="http://schemas.openxmlformats.org/drawingml/2006/main" xmlns:r="http://schemas.openxmlformats.org/officeDocument/2006/relationships" xmlns:p1510="http://schemas.microsoft.com/office/powerpoint/2015/10/main">
   <p1510:revLst>
-    <p1510:client id="{007D89BB-3B72-1E46-3326-4B88527C5836}" v="1276" dt="2020-11-22T01:00:27.309"/>
+    <p1510:client id="{007D89BB-3B72-1E46-3326-4B88527C5836}" v="1303" dt="2020-11-22T01:02:50.410"/>
     <p1510:client id="{65C67A5B-D439-DD4E-A637-827378D75345}" v="59" dt="2019-10-10T15:48:12.011"/>
   </p1510:revLst>
 </p1510:revInfo>
@@ -7233,7 +7233,7 @@
         <p:spPr>
           <a:xfrm>
             <a:off x="542925" y="6267450"/>
-            <a:ext cx="3619500" cy="246221"/>
+            <a:ext cx="3619500" cy="230832"/>
           </a:xfrm>
           <a:prstGeom prst="rect">
             <a:avLst/>
@@ -7250,13 +7250,13 @@
           <a:lstStyle/>
           <a:p>
             <a:r>
-              <a:rPr lang="en-US" sz="1000" dirty="0">
+              <a:rPr lang="en-US" sz="900" dirty="0">
                 <a:ea typeface="+mn-lt"/>
                 <a:cs typeface="+mn-lt"/>
               </a:rPr>
               <a:t>Fig 1 - Causes of US Wildfires</a:t>
             </a:r>
-            <a:endParaRPr lang="en-US" dirty="0">
+            <a:endParaRPr lang="en-US" sz="900">
               <a:cs typeface="Arial"/>
             </a:endParaRPr>
           </a:p>
@@ -7380,8 +7380,8 @@
         </p:nvSpPr>
         <p:spPr>
           <a:xfrm>
-            <a:off x="542925" y="6267450"/>
-            <a:ext cx="3619500" cy="246221"/>
+            <a:off x="552450" y="5953125"/>
+            <a:ext cx="3619500" cy="230832"/>
           </a:xfrm>
           <a:prstGeom prst="rect">
             <a:avLst/>
@@ -7398,16 +7398,12 @@
           <a:lstStyle/>
           <a:p>
             <a:r>
-              <a:rPr lang="en-US" sz="1000" dirty="0">
+              <a:rPr lang="en-US" sz="900" dirty="0">
                 <a:ea typeface="+mn-lt"/>
                 <a:cs typeface="+mn-lt"/>
               </a:rPr>
               <a:t>Fig 2 - Annual Count of US Wildfires</a:t>
             </a:r>
-            <a:endParaRPr lang="en-US" dirty="0">
-              <a:ea typeface="+mn-lt"/>
-              <a:cs typeface="+mn-lt"/>
-            </a:endParaRPr>
           </a:p>
         </p:txBody>
       </p:sp>
@@ -7559,8 +7555,8 @@
         </p:nvSpPr>
         <p:spPr>
           <a:xfrm>
-            <a:off x="542925" y="6267450"/>
-            <a:ext cx="3619500" cy="246221"/>
+            <a:off x="542925" y="5972175"/>
+            <a:ext cx="3619500" cy="230832"/>
           </a:xfrm>
           <a:prstGeom prst="rect">
             <a:avLst/>
@@ -7577,13 +7573,15 @@
           <a:lstStyle/>
           <a:p>
             <a:r>
-              <a:rPr lang="en-US" sz="1000" dirty="0">
+              <a:rPr lang="en-US" sz="900" dirty="0">
                 <a:ea typeface="+mn-lt"/>
                 <a:cs typeface="+mn-lt"/>
               </a:rPr>
               <a:t>Fig 3 - US Wildfires by State</a:t>
             </a:r>
-            <a:endParaRPr lang="en-US" dirty="0"/>
+            <a:endParaRPr lang="en-US" sz="900">
+              <a:cs typeface="Arial"/>
+            </a:endParaRPr>
           </a:p>
         </p:txBody>
       </p:sp>
@@ -7779,8 +7777,8 @@
         </p:nvSpPr>
         <p:spPr>
           <a:xfrm>
-            <a:off x="523875" y="4791075"/>
-            <a:ext cx="3619500" cy="246221"/>
+            <a:off x="523875" y="4686300"/>
+            <a:ext cx="3619500" cy="230832"/>
           </a:xfrm>
           <a:prstGeom prst="rect">
             <a:avLst/>
@@ -7797,13 +7795,15 @@
           <a:lstStyle/>
           <a:p>
             <a:r>
-              <a:rPr lang="en-US" sz="1000" dirty="0">
+              <a:rPr lang="en-US" sz="900" dirty="0">
                 <a:ea typeface="+mn-lt"/>
                 <a:cs typeface="+mn-lt"/>
               </a:rPr>
               <a:t>Table 1 – Model Features</a:t>
             </a:r>
-            <a:endParaRPr lang="en-US" dirty="0"/>
+            <a:endParaRPr lang="en-US" sz="900">
+              <a:cs typeface="Arial"/>
+            </a:endParaRPr>
           </a:p>
         </p:txBody>
       </p:sp>
@@ -7891,8 +7891,8 @@
         </p:nvSpPr>
         <p:spPr>
           <a:xfrm>
-            <a:off x="504825" y="6372225"/>
-            <a:ext cx="3619500" cy="246221"/>
+            <a:off x="523875" y="6334125"/>
+            <a:ext cx="3619500" cy="230832"/>
           </a:xfrm>
           <a:prstGeom prst="rect">
             <a:avLst/>
@@ -7909,13 +7909,15 @@
           <a:lstStyle/>
           <a:p>
             <a:r>
-              <a:rPr lang="en-US" sz="1000" dirty="0">
+              <a:rPr lang="en-US" sz="900" dirty="0">
                 <a:ea typeface="+mn-lt"/>
                 <a:cs typeface="+mn-lt"/>
               </a:rPr>
               <a:t>Table 2 – Predictor Classification Labels</a:t>
             </a:r>
-            <a:endParaRPr lang="en-US" dirty="0"/>
+            <a:endParaRPr lang="en-US" sz="900">
+              <a:cs typeface="Arial"/>
+            </a:endParaRPr>
           </a:p>
         </p:txBody>
       </p:sp>
@@ -8040,8 +8042,8 @@
         </p:nvSpPr>
         <p:spPr>
           <a:xfrm>
-            <a:off x="561975" y="5629275"/>
-            <a:ext cx="3619500" cy="246221"/>
+            <a:off x="561975" y="5524500"/>
+            <a:ext cx="3619500" cy="230832"/>
           </a:xfrm>
           <a:prstGeom prst="rect">
             <a:avLst/>
@@ -8058,13 +8060,15 @@
           <a:lstStyle/>
           <a:p>
             <a:r>
-              <a:rPr lang="en-US" sz="1000" dirty="0">
+              <a:rPr lang="en-US" sz="900" dirty="0">
                 <a:ea typeface="+mn-lt"/>
                 <a:cs typeface="+mn-lt"/>
               </a:rPr>
               <a:t>Table 3 – Model Performance</a:t>
             </a:r>
-            <a:endParaRPr lang="en-US" dirty="0"/>
+            <a:endParaRPr lang="en-US" sz="900">
+              <a:cs typeface="Arial"/>
+            </a:endParaRPr>
           </a:p>
         </p:txBody>
       </p:sp>

</xml_diff>